<commit_message>
Di chuyển Source vào folder SourceCode, thêm bảng phân công
</commit_message>
<xml_diff>
--- a/ThuyetTrinhBaoCaoMaNguonMo.pptx
+++ b/ThuyetTrinhBaoCaoMaNguonMo.pptx
@@ -120,7 +120,7 @@
   </p:defaultTextStyle>
   <p:extLst>
     <p:ext uri="{EFAFB233-063F-42B5-8137-9DF3F51BA10A}">
-      <p15:sldGuideLst xmlns:p15="http://schemas.microsoft.com/office/powerpoint/2012/main" xmlns="">
+      <p15:sldGuideLst xmlns="" xmlns:p15="http://schemas.microsoft.com/office/powerpoint/2012/main">
         <p15:guide id="1" orient="horz" pos="2208" userDrawn="1">
           <p15:clr>
             <a:srgbClr val="A4A3A4"/>
@@ -299,7 +299,7 @@
           <p:cNvPr id="2" name="그림 개체 틀 2">
             <a:extLst>
               <a:ext uri="{FF2B5EF4-FFF2-40B4-BE49-F238E27FC236}">
-                <a16:creationId xmlns:a16="http://schemas.microsoft.com/office/drawing/2014/main" xmlns="" id="{5554FB4E-E79F-4FCD-B373-1990A7E51642}"/>
+                <a16:creationId xmlns="" xmlns:a16="http://schemas.microsoft.com/office/drawing/2014/main" id="{5554FB4E-E79F-4FCD-B373-1990A7E51642}"/>
               </a:ext>
             </a:extLst>
           </p:cNvPr>
@@ -989,7 +989,7 @@
           <p:cNvPr id="58" name="TextBox 57">
             <a:extLst>
               <a:ext uri="{FF2B5EF4-FFF2-40B4-BE49-F238E27FC236}">
-                <a16:creationId xmlns:a16="http://schemas.microsoft.com/office/drawing/2014/main" xmlns="" id="{5644E8BB-F13A-4AE0-889E-633DE4143787}"/>
+                <a16:creationId xmlns="" xmlns:a16="http://schemas.microsoft.com/office/drawing/2014/main" id="{5644E8BB-F13A-4AE0-889E-633DE4143787}"/>
               </a:ext>
             </a:extLst>
           </p:cNvPr>
@@ -1037,7 +1037,7 @@
           <p:cNvPr id="59" name="TextBox 58">
             <a:extLst>
               <a:ext uri="{FF2B5EF4-FFF2-40B4-BE49-F238E27FC236}">
-                <a16:creationId xmlns:a16="http://schemas.microsoft.com/office/drawing/2014/main" xmlns="" id="{F2CE2B8B-ED32-491A-95B2-D28904BC432C}"/>
+                <a16:creationId xmlns="" xmlns:a16="http://schemas.microsoft.com/office/drawing/2014/main" id="{F2CE2B8B-ED32-491A-95B2-D28904BC432C}"/>
               </a:ext>
             </a:extLst>
           </p:cNvPr>
@@ -1097,7 +1097,7 @@
           <p:cNvPr id="60" name="TextBox 59">
             <a:extLst>
               <a:ext uri="{FF2B5EF4-FFF2-40B4-BE49-F238E27FC236}">
-                <a16:creationId xmlns:a16="http://schemas.microsoft.com/office/drawing/2014/main" xmlns="" id="{962A52DF-2523-4479-BFA3-B5ACE9887E1C}"/>
+                <a16:creationId xmlns="" xmlns:a16="http://schemas.microsoft.com/office/drawing/2014/main" id="{962A52DF-2523-4479-BFA3-B5ACE9887E1C}"/>
               </a:ext>
             </a:extLst>
           </p:cNvPr>
@@ -1145,7 +1145,7 @@
           <p:cNvPr id="61" name="TextBox 60">
             <a:extLst>
               <a:ext uri="{FF2B5EF4-FFF2-40B4-BE49-F238E27FC236}">
-                <a16:creationId xmlns:a16="http://schemas.microsoft.com/office/drawing/2014/main" xmlns="" id="{BAAC314F-E96A-4408-95DE-A70E9ED054AF}"/>
+                <a16:creationId xmlns="" xmlns:a16="http://schemas.microsoft.com/office/drawing/2014/main" id="{BAAC314F-E96A-4408-95DE-A70E9ED054AF}"/>
               </a:ext>
             </a:extLst>
           </p:cNvPr>
@@ -1318,7 +1318,7 @@
           <p:cNvPr id="2" name="Text Placeholder 9">
             <a:extLst>
               <a:ext uri="{FF2B5EF4-FFF2-40B4-BE49-F238E27FC236}">
-                <a16:creationId xmlns:a16="http://schemas.microsoft.com/office/drawing/2014/main" xmlns="" id="{23DE32A5-6181-4C51-AD5C-3F1A448478A1}"/>
+                <a16:creationId xmlns="" xmlns:a16="http://schemas.microsoft.com/office/drawing/2014/main" id="{23DE32A5-6181-4C51-AD5C-3F1A448478A1}"/>
               </a:ext>
             </a:extLst>
           </p:cNvPr>
@@ -1399,7 +1399,7 @@
           <p:cNvPr id="2" name="Text Placeholder 9">
             <a:extLst>
               <a:ext uri="{FF2B5EF4-FFF2-40B4-BE49-F238E27FC236}">
-                <a16:creationId xmlns:a16="http://schemas.microsoft.com/office/drawing/2014/main" xmlns="" id="{23DE32A5-6181-4C51-AD5C-3F1A448478A1}"/>
+                <a16:creationId xmlns="" xmlns:a16="http://schemas.microsoft.com/office/drawing/2014/main" id="{23DE32A5-6181-4C51-AD5C-3F1A448478A1}"/>
               </a:ext>
             </a:extLst>
           </p:cNvPr>
@@ -1554,7 +1554,7 @@
           <p:cNvPr id="2" name="Rectangle 1">
             <a:extLst>
               <a:ext uri="{FF2B5EF4-FFF2-40B4-BE49-F238E27FC236}">
-                <a16:creationId xmlns:a16="http://schemas.microsoft.com/office/drawing/2014/main" xmlns="" id="{321DB724-9006-424E-A191-C08CB17EE2CA}"/>
+                <a16:creationId xmlns="" xmlns:a16="http://schemas.microsoft.com/office/drawing/2014/main" id="{321DB724-9006-424E-A191-C08CB17EE2CA}"/>
               </a:ext>
             </a:extLst>
           </p:cNvPr>
@@ -1603,7 +1603,7 @@
           <p:cNvPr id="4" name="그림 개체 틀 2">
             <a:extLst>
               <a:ext uri="{FF2B5EF4-FFF2-40B4-BE49-F238E27FC236}">
-                <a16:creationId xmlns:a16="http://schemas.microsoft.com/office/drawing/2014/main" xmlns="" id="{13FB2FD4-D355-49C8-B7E0-BC49131F2FEA}"/>
+                <a16:creationId xmlns="" xmlns:a16="http://schemas.microsoft.com/office/drawing/2014/main" id="{13FB2FD4-D355-49C8-B7E0-BC49131F2FEA}"/>
               </a:ext>
             </a:extLst>
           </p:cNvPr>
@@ -1688,7 +1688,7 @@
           <p:cNvPr id="2" name="그림 1">
             <a:extLst>
               <a:ext uri="{FF2B5EF4-FFF2-40B4-BE49-F238E27FC236}">
-                <a16:creationId xmlns:a16="http://schemas.microsoft.com/office/drawing/2014/main" xmlns="" id="{54BAF68A-9D51-4222-8013-E9B5F820985D}"/>
+                <a16:creationId xmlns="" xmlns:a16="http://schemas.microsoft.com/office/drawing/2014/main" id="{54BAF68A-9D51-4222-8013-E9B5F820985D}"/>
               </a:ext>
             </a:extLst>
           </p:cNvPr>
@@ -1724,7 +1724,7 @@
           <p:cNvPr id="3" name="Picture 3" descr="E:\002-KIMS BUSINESS\007-02-MaxPPT-Contents\150902-com-Global-Laptop\mo900.png">
             <a:extLst>
               <a:ext uri="{FF2B5EF4-FFF2-40B4-BE49-F238E27FC236}">
-                <a16:creationId xmlns:a16="http://schemas.microsoft.com/office/drawing/2014/main" xmlns="" id="{1C4F8B41-3F98-4240-8891-4ADABC669A41}"/>
+                <a16:creationId xmlns="" xmlns:a16="http://schemas.microsoft.com/office/drawing/2014/main" id="{1C4F8B41-3F98-4240-8891-4ADABC669A41}"/>
               </a:ext>
             </a:extLst>
           </p:cNvPr>
@@ -1778,7 +1778,7 @@
           <p:cNvPr id="4" name="Picture Placeholder 2">
             <a:extLst>
               <a:ext uri="{FF2B5EF4-FFF2-40B4-BE49-F238E27FC236}">
-                <a16:creationId xmlns:a16="http://schemas.microsoft.com/office/drawing/2014/main" xmlns="" id="{88CB46E1-8EB0-4782-9CDE-623B6BC6877B}"/>
+                <a16:creationId xmlns="" xmlns:a16="http://schemas.microsoft.com/office/drawing/2014/main" id="{88CB46E1-8EB0-4782-9CDE-623B6BC6877B}"/>
               </a:ext>
             </a:extLst>
           </p:cNvPr>
@@ -1981,7 +1981,7 @@
           <p:cNvPr id="5" name="Text Placeholder 9">
             <a:extLst>
               <a:ext uri="{FF2B5EF4-FFF2-40B4-BE49-F238E27FC236}">
-                <a16:creationId xmlns:a16="http://schemas.microsoft.com/office/drawing/2014/main" xmlns="" id="{388CF590-A7AC-47AA-9D77-5FF843A9CEE8}"/>
+                <a16:creationId xmlns="" xmlns:a16="http://schemas.microsoft.com/office/drawing/2014/main" id="{388CF590-A7AC-47AA-9D77-5FF843A9CEE8}"/>
               </a:ext>
             </a:extLst>
           </p:cNvPr>
@@ -3068,7 +3068,7 @@
           <p:cNvPr id="14" name="TextBox 13">
             <a:extLst>
               <a:ext uri="{FF2B5EF4-FFF2-40B4-BE49-F238E27FC236}">
-                <a16:creationId xmlns:a16="http://schemas.microsoft.com/office/drawing/2014/main" xmlns="" id="{7F82C53E-6891-4695-A1B4-3BB471D7FA35}"/>
+                <a16:creationId xmlns="" xmlns:a16="http://schemas.microsoft.com/office/drawing/2014/main" id="{7F82C53E-6891-4695-A1B4-3BB471D7FA35}"/>
               </a:ext>
             </a:extLst>
           </p:cNvPr>
@@ -3264,7 +3264,7 @@
             <a:hlinkClick r:id="rId2"/>
             <a:extLst>
               <a:ext uri="{FF2B5EF4-FFF2-40B4-BE49-F238E27FC236}">
-                <a16:creationId xmlns:a16="http://schemas.microsoft.com/office/drawing/2014/main" xmlns="" id="{CF639353-2FBF-45AF-BF9B-02441FCB654D}"/>
+                <a16:creationId xmlns="" xmlns:a16="http://schemas.microsoft.com/office/drawing/2014/main" id="{CF639353-2FBF-45AF-BF9B-02441FCB654D}"/>
               </a:ext>
             </a:extLst>
           </p:cNvPr>
@@ -3297,7 +3297,7 @@
                 <a:hlinkClick r:id="rId2">
                   <a:extLst>
                     <a:ext uri="{A12FA001-AC4F-418D-AE19-62706E023703}">
-                      <ahyp:hlinkClr xmlns:ahyp="http://schemas.microsoft.com/office/drawing/2018/hyperlinkcolor" xmlns="" val="tx"/>
+                      <ahyp:hlinkClr xmlns="" xmlns:ahyp="http://schemas.microsoft.com/office/drawing/2018/hyperlinkcolor" val="tx"/>
                     </a:ext>
                   </a:extLst>
                 </a:hlinkClick>
@@ -4749,7 +4749,7 @@
           <p:cNvPr id="8" name="TextBox 7">
             <a:extLst>
               <a:ext uri="{FF2B5EF4-FFF2-40B4-BE49-F238E27FC236}">
-                <a16:creationId xmlns:a16="http://schemas.microsoft.com/office/drawing/2014/main" xmlns="" id="{5CF5BDA4-10C7-46A6-AC30-523A3FC438AC}"/>
+                <a16:creationId xmlns="" xmlns:a16="http://schemas.microsoft.com/office/drawing/2014/main" id="{5CF5BDA4-10C7-46A6-AC30-523A3FC438AC}"/>
               </a:ext>
             </a:extLst>
           </p:cNvPr>
@@ -4854,7 +4854,7 @@
           <p:cNvPr id="2" name="TextBox 1">
             <a:extLst>
               <a:ext uri="{FF2B5EF4-FFF2-40B4-BE49-F238E27FC236}">
-                <a16:creationId xmlns:a16="http://schemas.microsoft.com/office/drawing/2014/main" xmlns="" id="{29E2714A-BE29-4E83-A155-D5802C472B0A}"/>
+                <a16:creationId xmlns="" xmlns:a16="http://schemas.microsoft.com/office/drawing/2014/main" id="{29E2714A-BE29-4E83-A155-D5802C472B0A}"/>
               </a:ext>
             </a:extLst>
           </p:cNvPr>
@@ -4901,7 +4901,7 @@
           <p:cNvPr id="4" name="Rectangle 3">
             <a:extLst>
               <a:ext uri="{FF2B5EF4-FFF2-40B4-BE49-F238E27FC236}">
-                <a16:creationId xmlns:a16="http://schemas.microsoft.com/office/drawing/2014/main" xmlns="" id="{F0B50BDA-9DD3-47E4-8852-4E61CF2A00B0}"/>
+                <a16:creationId xmlns="" xmlns:a16="http://schemas.microsoft.com/office/drawing/2014/main" id="{F0B50BDA-9DD3-47E4-8852-4E61CF2A00B0}"/>
               </a:ext>
             </a:extLst>
           </p:cNvPr>
@@ -4950,7 +4950,7 @@
           <p:cNvPr id="5" name="Rectangle 4">
             <a:extLst>
               <a:ext uri="{FF2B5EF4-FFF2-40B4-BE49-F238E27FC236}">
-                <a16:creationId xmlns:a16="http://schemas.microsoft.com/office/drawing/2014/main" xmlns="" id="{0F4F188E-C654-4B5C-ABF1-DB0BEABF2171}"/>
+                <a16:creationId xmlns="" xmlns:a16="http://schemas.microsoft.com/office/drawing/2014/main" id="{0F4F188E-C654-4B5C-ABF1-DB0BEABF2171}"/>
               </a:ext>
             </a:extLst>
           </p:cNvPr>
@@ -5036,7 +5036,7 @@
           <p:cNvPr id="30" name="Group 29">
             <a:extLst>
               <a:ext uri="{FF2B5EF4-FFF2-40B4-BE49-F238E27FC236}">
-                <a16:creationId xmlns:a16="http://schemas.microsoft.com/office/drawing/2014/main" xmlns="" id="{7140712F-FC83-445F-B944-5EB1E598C9AE}"/>
+                <a16:creationId xmlns="" xmlns:a16="http://schemas.microsoft.com/office/drawing/2014/main" id="{7140712F-FC83-445F-B944-5EB1E598C9AE}"/>
               </a:ext>
             </a:extLst>
           </p:cNvPr>
@@ -5056,7 +5056,7 @@
             <p:cNvPr id="10" name="TextBox 9">
               <a:extLst>
                 <a:ext uri="{FF2B5EF4-FFF2-40B4-BE49-F238E27FC236}">
-                  <a16:creationId xmlns:a16="http://schemas.microsoft.com/office/drawing/2014/main" xmlns="" id="{A38BD834-09E2-46F2-89F6-8B322FC08232}"/>
+                  <a16:creationId xmlns="" xmlns:a16="http://schemas.microsoft.com/office/drawing/2014/main" id="{A38BD834-09E2-46F2-89F6-8B322FC08232}"/>
                 </a:ext>
               </a:extLst>
             </p:cNvPr>
@@ -5156,7 +5156,7 @@
             <p:cNvPr id="11" name="TextBox 10">
               <a:extLst>
                 <a:ext uri="{FF2B5EF4-FFF2-40B4-BE49-F238E27FC236}">
-                  <a16:creationId xmlns:a16="http://schemas.microsoft.com/office/drawing/2014/main" xmlns="" id="{D2BB98E8-4C33-44A6-AA84-C24039CCFA6F}"/>
+                  <a16:creationId xmlns="" xmlns:a16="http://schemas.microsoft.com/office/drawing/2014/main" id="{D2BB98E8-4C33-44A6-AA84-C24039CCFA6F}"/>
                 </a:ext>
               </a:extLst>
             </p:cNvPr>
@@ -5204,7 +5204,7 @@
           <p:cNvPr id="31" name="Group 30">
             <a:extLst>
               <a:ext uri="{FF2B5EF4-FFF2-40B4-BE49-F238E27FC236}">
-                <a16:creationId xmlns:a16="http://schemas.microsoft.com/office/drawing/2014/main" xmlns="" id="{FC34C18B-00FD-416B-BB1A-ADF93EDF3F3B}"/>
+                <a16:creationId xmlns="" xmlns:a16="http://schemas.microsoft.com/office/drawing/2014/main" id="{FC34C18B-00FD-416B-BB1A-ADF93EDF3F3B}"/>
               </a:ext>
             </a:extLst>
           </p:cNvPr>
@@ -5224,7 +5224,7 @@
             <p:cNvPr id="14" name="TextBox 13">
               <a:extLst>
                 <a:ext uri="{FF2B5EF4-FFF2-40B4-BE49-F238E27FC236}">
-                  <a16:creationId xmlns:a16="http://schemas.microsoft.com/office/drawing/2014/main" xmlns="" id="{29BF85FC-CB9F-48CC-97AD-24B8EB0149E1}"/>
+                  <a16:creationId xmlns="" xmlns:a16="http://schemas.microsoft.com/office/drawing/2014/main" id="{29BF85FC-CB9F-48CC-97AD-24B8EB0149E1}"/>
                 </a:ext>
               </a:extLst>
             </p:cNvPr>
@@ -5324,7 +5324,7 @@
             <p:cNvPr id="15" name="TextBox 14">
               <a:extLst>
                 <a:ext uri="{FF2B5EF4-FFF2-40B4-BE49-F238E27FC236}">
-                  <a16:creationId xmlns:a16="http://schemas.microsoft.com/office/drawing/2014/main" xmlns="" id="{E2E1452F-F7C5-4578-B19C-4A14A1B26C8B}"/>
+                  <a16:creationId xmlns="" xmlns:a16="http://schemas.microsoft.com/office/drawing/2014/main" id="{E2E1452F-F7C5-4578-B19C-4A14A1B26C8B}"/>
                 </a:ext>
               </a:extLst>
             </p:cNvPr>
@@ -5372,7 +5372,7 @@
           <p:cNvPr id="32" name="Group 31">
             <a:extLst>
               <a:ext uri="{FF2B5EF4-FFF2-40B4-BE49-F238E27FC236}">
-                <a16:creationId xmlns:a16="http://schemas.microsoft.com/office/drawing/2014/main" xmlns="" id="{60C3BA0C-6C6D-4734-A5DA-5BF5FF9719BC}"/>
+                <a16:creationId xmlns="" xmlns:a16="http://schemas.microsoft.com/office/drawing/2014/main" id="{60C3BA0C-6C6D-4734-A5DA-5BF5FF9719BC}"/>
               </a:ext>
             </a:extLst>
           </p:cNvPr>
@@ -5392,7 +5392,7 @@
             <p:cNvPr id="18" name="TextBox 17">
               <a:extLst>
                 <a:ext uri="{FF2B5EF4-FFF2-40B4-BE49-F238E27FC236}">
-                  <a16:creationId xmlns:a16="http://schemas.microsoft.com/office/drawing/2014/main" xmlns="" id="{6F76D16D-BF18-43EF-9AF7-F44F3D563A0E}"/>
+                  <a16:creationId xmlns="" xmlns:a16="http://schemas.microsoft.com/office/drawing/2014/main" id="{6F76D16D-BF18-43EF-9AF7-F44F3D563A0E}"/>
                 </a:ext>
               </a:extLst>
             </p:cNvPr>
@@ -5438,7 +5438,7 @@
             <p:cNvPr id="19" name="TextBox 18">
               <a:extLst>
                 <a:ext uri="{FF2B5EF4-FFF2-40B4-BE49-F238E27FC236}">
-                  <a16:creationId xmlns:a16="http://schemas.microsoft.com/office/drawing/2014/main" xmlns="" id="{D09C452E-68D3-4C74-8A4E-0EBFDEF40F5D}"/>
+                  <a16:creationId xmlns="" xmlns:a16="http://schemas.microsoft.com/office/drawing/2014/main" id="{D09C452E-68D3-4C74-8A4E-0EBFDEF40F5D}"/>
                 </a:ext>
               </a:extLst>
             </p:cNvPr>
@@ -5486,7 +5486,7 @@
           <p:cNvPr id="29" name="Group 28">
             <a:extLst>
               <a:ext uri="{FF2B5EF4-FFF2-40B4-BE49-F238E27FC236}">
-                <a16:creationId xmlns:a16="http://schemas.microsoft.com/office/drawing/2014/main" xmlns="" id="{4E5E848E-A974-439C-AFED-596F42435111}"/>
+                <a16:creationId xmlns="" xmlns:a16="http://schemas.microsoft.com/office/drawing/2014/main" id="{4E5E848E-A974-439C-AFED-596F42435111}"/>
               </a:ext>
             </a:extLst>
           </p:cNvPr>
@@ -5506,7 +5506,7 @@
             <p:cNvPr id="6" name="TextBox 5">
               <a:extLst>
                 <a:ext uri="{FF2B5EF4-FFF2-40B4-BE49-F238E27FC236}">
-                  <a16:creationId xmlns:a16="http://schemas.microsoft.com/office/drawing/2014/main" xmlns="" id="{B07582D1-C7E7-41E1-BF7A-D9460BAE7556}"/>
+                  <a16:creationId xmlns="" xmlns:a16="http://schemas.microsoft.com/office/drawing/2014/main" id="{B07582D1-C7E7-41E1-BF7A-D9460BAE7556}"/>
                 </a:ext>
               </a:extLst>
             </p:cNvPr>
@@ -5570,7 +5570,7 @@
             <p:cNvPr id="7" name="TextBox 6">
               <a:extLst>
                 <a:ext uri="{FF2B5EF4-FFF2-40B4-BE49-F238E27FC236}">
-                  <a16:creationId xmlns:a16="http://schemas.microsoft.com/office/drawing/2014/main" xmlns="" id="{89D53A5A-B18B-4EDC-BA10-843AF3775AB4}"/>
+                  <a16:creationId xmlns="" xmlns:a16="http://schemas.microsoft.com/office/drawing/2014/main" id="{89D53A5A-B18B-4EDC-BA10-843AF3775AB4}"/>
                 </a:ext>
               </a:extLst>
             </p:cNvPr>
@@ -5655,7 +5655,7 @@
           <p:cNvPr id="30" name="Group 29">
             <a:extLst>
               <a:ext uri="{FF2B5EF4-FFF2-40B4-BE49-F238E27FC236}">
-                <a16:creationId xmlns:a16="http://schemas.microsoft.com/office/drawing/2014/main" xmlns="" id="{7140712F-FC83-445F-B944-5EB1E598C9AE}"/>
+                <a16:creationId xmlns="" xmlns:a16="http://schemas.microsoft.com/office/drawing/2014/main" id="{7140712F-FC83-445F-B944-5EB1E598C9AE}"/>
               </a:ext>
             </a:extLst>
           </p:cNvPr>
@@ -5675,7 +5675,7 @@
             <p:cNvPr id="10" name="TextBox 9">
               <a:extLst>
                 <a:ext uri="{FF2B5EF4-FFF2-40B4-BE49-F238E27FC236}">
-                  <a16:creationId xmlns:a16="http://schemas.microsoft.com/office/drawing/2014/main" xmlns="" id="{A38BD834-09E2-46F2-89F6-8B322FC08232}"/>
+                  <a16:creationId xmlns="" xmlns:a16="http://schemas.microsoft.com/office/drawing/2014/main" id="{A38BD834-09E2-46F2-89F6-8B322FC08232}"/>
                 </a:ext>
               </a:extLst>
             </p:cNvPr>
@@ -5698,6 +5698,69 @@
             </a:bodyPr>
             <a:lstStyle/>
             <a:p>
+              <a:r>
+                <a:rPr lang="en-US" altLang="ko-KR" sz="2800" b="1" dirty="0" err="1" smtClean="0">
+                  <a:solidFill>
+                    <a:schemeClr val="bg1"/>
+                  </a:solidFill>
+                  <a:cs typeface="Arial" pitchFamily="34" charset="0"/>
+                </a:rPr>
+                <a:t>Phan</a:t>
+              </a:r>
+              <a:r>
+                <a:rPr lang="en-US" altLang="ko-KR" sz="2800" b="1" dirty="0" smtClean="0">
+                  <a:solidFill>
+                    <a:schemeClr val="bg1"/>
+                  </a:solidFill>
+                  <a:cs typeface="Arial" pitchFamily="34" charset="0"/>
+                </a:rPr>
+                <a:t> </a:t>
+              </a:r>
+              <a:r>
+                <a:rPr lang="en-US" altLang="ko-KR" sz="2800" b="1" dirty="0" err="1" smtClean="0">
+                  <a:solidFill>
+                    <a:schemeClr val="bg1"/>
+                  </a:solidFill>
+                  <a:cs typeface="Arial" pitchFamily="34" charset="0"/>
+                </a:rPr>
+                <a:t>Ngọc</a:t>
+              </a:r>
+              <a:r>
+                <a:rPr lang="en-US" altLang="ko-KR" sz="2800" b="1" dirty="0" smtClean="0">
+                  <a:solidFill>
+                    <a:schemeClr val="bg1"/>
+                  </a:solidFill>
+                  <a:cs typeface="Arial" pitchFamily="34" charset="0"/>
+                </a:rPr>
+                <a:t> </a:t>
+              </a:r>
+              <a:r>
+                <a:rPr lang="en-US" altLang="ko-KR" sz="2800" b="1" dirty="0" err="1" smtClean="0">
+                  <a:solidFill>
+                    <a:schemeClr val="bg1"/>
+                  </a:solidFill>
+                  <a:cs typeface="Arial" pitchFamily="34" charset="0"/>
+                </a:rPr>
+                <a:t>Hồng</a:t>
+              </a:r>
+              <a:r>
+                <a:rPr lang="en-US" altLang="ko-KR" sz="2800" b="1" dirty="0" smtClean="0">
+                  <a:solidFill>
+                    <a:schemeClr val="bg1"/>
+                  </a:solidFill>
+                  <a:cs typeface="Arial" pitchFamily="34" charset="0"/>
+                </a:rPr>
+                <a:t> </a:t>
+              </a:r>
+              <a:r>
+                <a:rPr lang="en-US" altLang="ko-KR" sz="2800" b="1" dirty="0" err="1" smtClean="0">
+                  <a:solidFill>
+                    <a:schemeClr val="bg1"/>
+                  </a:solidFill>
+                  <a:cs typeface="Arial" pitchFamily="34" charset="0"/>
+                </a:rPr>
+                <a:t>Đào</a:t>
+              </a:r>
               <a:endParaRPr lang="ko-KR" altLang="en-US" sz="2800" b="1" dirty="0">
                 <a:solidFill>
                   <a:schemeClr val="bg1"/>
@@ -5712,7 +5775,7 @@
             <p:cNvPr id="11" name="TextBox 10">
               <a:extLst>
                 <a:ext uri="{FF2B5EF4-FFF2-40B4-BE49-F238E27FC236}">
-                  <a16:creationId xmlns:a16="http://schemas.microsoft.com/office/drawing/2014/main" xmlns="" id="{D2BB98E8-4C33-44A6-AA84-C24039CCFA6F}"/>
+                  <a16:creationId xmlns="" xmlns:a16="http://schemas.microsoft.com/office/drawing/2014/main" id="{D2BB98E8-4C33-44A6-AA84-C24039CCFA6F}"/>
                 </a:ext>
               </a:extLst>
             </p:cNvPr>
@@ -5760,7 +5823,7 @@
           <p:cNvPr id="31" name="Group 30">
             <a:extLst>
               <a:ext uri="{FF2B5EF4-FFF2-40B4-BE49-F238E27FC236}">
-                <a16:creationId xmlns:a16="http://schemas.microsoft.com/office/drawing/2014/main" xmlns="" id="{FC34C18B-00FD-416B-BB1A-ADF93EDF3F3B}"/>
+                <a16:creationId xmlns="" xmlns:a16="http://schemas.microsoft.com/office/drawing/2014/main" id="{FC34C18B-00FD-416B-BB1A-ADF93EDF3F3B}"/>
               </a:ext>
             </a:extLst>
           </p:cNvPr>
@@ -5780,7 +5843,7 @@
             <p:cNvPr id="14" name="TextBox 13">
               <a:extLst>
                 <a:ext uri="{FF2B5EF4-FFF2-40B4-BE49-F238E27FC236}">
-                  <a16:creationId xmlns:a16="http://schemas.microsoft.com/office/drawing/2014/main" xmlns="" id="{29BF85FC-CB9F-48CC-97AD-24B8EB0149E1}"/>
+                  <a16:creationId xmlns="" xmlns:a16="http://schemas.microsoft.com/office/drawing/2014/main" id="{29BF85FC-CB9F-48CC-97AD-24B8EB0149E1}"/>
                 </a:ext>
               </a:extLst>
             </p:cNvPr>
@@ -5803,6 +5866,51 @@
             </a:bodyPr>
             <a:lstStyle/>
             <a:p>
+              <a:r>
+                <a:rPr lang="en-US" altLang="ko-KR" sz="2800" b="1" dirty="0" err="1" smtClean="0">
+                  <a:solidFill>
+                    <a:schemeClr val="bg1"/>
+                  </a:solidFill>
+                  <a:cs typeface="Arial" pitchFamily="34" charset="0"/>
+                </a:rPr>
+                <a:t>Ngô</a:t>
+              </a:r>
+              <a:r>
+                <a:rPr lang="en-US" altLang="ko-KR" sz="2800" b="1" dirty="0" smtClean="0">
+                  <a:solidFill>
+                    <a:schemeClr val="bg1"/>
+                  </a:solidFill>
+                  <a:cs typeface="Arial" pitchFamily="34" charset="0"/>
+                </a:rPr>
+                <a:t> </a:t>
+              </a:r>
+              <a:r>
+                <a:rPr lang="en-US" altLang="ko-KR" sz="2800" b="1" dirty="0" err="1" smtClean="0">
+                  <a:solidFill>
+                    <a:schemeClr val="bg1"/>
+                  </a:solidFill>
+                  <a:cs typeface="Arial" pitchFamily="34" charset="0"/>
+                </a:rPr>
+                <a:t>Trung</a:t>
+              </a:r>
+              <a:r>
+                <a:rPr lang="en-US" altLang="ko-KR" sz="2800" b="1" dirty="0" smtClean="0">
+                  <a:solidFill>
+                    <a:schemeClr val="bg1"/>
+                  </a:solidFill>
+                  <a:cs typeface="Arial" pitchFamily="34" charset="0"/>
+                </a:rPr>
+                <a:t> </a:t>
+              </a:r>
+              <a:r>
+                <a:rPr lang="en-US" altLang="ko-KR" sz="2800" b="1" dirty="0" err="1" smtClean="0">
+                  <a:solidFill>
+                    <a:schemeClr val="bg1"/>
+                  </a:solidFill>
+                  <a:cs typeface="Arial" pitchFamily="34" charset="0"/>
+                </a:rPr>
+                <a:t>Hiếu</a:t>
+              </a:r>
               <a:endParaRPr lang="ko-KR" altLang="en-US" sz="2800" b="1" dirty="0">
                 <a:solidFill>
                   <a:schemeClr val="bg1"/>
@@ -5817,7 +5925,7 @@
             <p:cNvPr id="15" name="TextBox 14">
               <a:extLst>
                 <a:ext uri="{FF2B5EF4-FFF2-40B4-BE49-F238E27FC236}">
-                  <a16:creationId xmlns:a16="http://schemas.microsoft.com/office/drawing/2014/main" xmlns="" id="{E2E1452F-F7C5-4578-B19C-4A14A1B26C8B}"/>
+                  <a16:creationId xmlns="" xmlns:a16="http://schemas.microsoft.com/office/drawing/2014/main" id="{E2E1452F-F7C5-4578-B19C-4A14A1B26C8B}"/>
                 </a:ext>
               </a:extLst>
             </p:cNvPr>
@@ -5865,7 +5973,7 @@
           <p:cNvPr id="29" name="Group 28">
             <a:extLst>
               <a:ext uri="{FF2B5EF4-FFF2-40B4-BE49-F238E27FC236}">
-                <a16:creationId xmlns:a16="http://schemas.microsoft.com/office/drawing/2014/main" xmlns="" id="{4E5E848E-A974-439C-AFED-596F42435111}"/>
+                <a16:creationId xmlns="" xmlns:a16="http://schemas.microsoft.com/office/drawing/2014/main" id="{4E5E848E-A974-439C-AFED-596F42435111}"/>
               </a:ext>
             </a:extLst>
           </p:cNvPr>
@@ -5885,7 +5993,7 @@
             <p:cNvPr id="6" name="TextBox 5">
               <a:extLst>
                 <a:ext uri="{FF2B5EF4-FFF2-40B4-BE49-F238E27FC236}">
-                  <a16:creationId xmlns:a16="http://schemas.microsoft.com/office/drawing/2014/main" xmlns="" id="{B07582D1-C7E7-41E1-BF7A-D9460BAE7556}"/>
+                  <a16:creationId xmlns="" xmlns:a16="http://schemas.microsoft.com/office/drawing/2014/main" id="{B07582D1-C7E7-41E1-BF7A-D9460BAE7556}"/>
                 </a:ext>
               </a:extLst>
             </p:cNvPr>
@@ -5908,6 +6016,69 @@
             </a:bodyPr>
             <a:lstStyle/>
             <a:p>
+              <a:r>
+                <a:rPr lang="en-US" altLang="ko-KR" sz="2800" b="1" dirty="0" err="1" smtClean="0">
+                  <a:solidFill>
+                    <a:schemeClr val="bg1"/>
+                  </a:solidFill>
+                  <a:cs typeface="Arial" pitchFamily="34" charset="0"/>
+                </a:rPr>
+                <a:t>Nguyễn</a:t>
+              </a:r>
+              <a:r>
+                <a:rPr lang="en-US" altLang="ko-KR" sz="2800" b="1" dirty="0" smtClean="0">
+                  <a:solidFill>
+                    <a:schemeClr val="bg1"/>
+                  </a:solidFill>
+                  <a:cs typeface="Arial" pitchFamily="34" charset="0"/>
+                </a:rPr>
+                <a:t> </a:t>
+              </a:r>
+              <a:r>
+                <a:rPr lang="en-US" altLang="ko-KR" sz="2800" b="1" dirty="0" err="1" smtClean="0">
+                  <a:solidFill>
+                    <a:schemeClr val="bg1"/>
+                  </a:solidFill>
+                  <a:cs typeface="Arial" pitchFamily="34" charset="0"/>
+                </a:rPr>
+                <a:t>Phạm</a:t>
+              </a:r>
+              <a:r>
+                <a:rPr lang="en-US" altLang="ko-KR" sz="2800" b="1" dirty="0" smtClean="0">
+                  <a:solidFill>
+                    <a:schemeClr val="bg1"/>
+                  </a:solidFill>
+                  <a:cs typeface="Arial" pitchFamily="34" charset="0"/>
+                </a:rPr>
+                <a:t> </a:t>
+              </a:r>
+              <a:r>
+                <a:rPr lang="en-US" altLang="ko-KR" sz="2800" b="1" dirty="0" err="1" smtClean="0">
+                  <a:solidFill>
+                    <a:schemeClr val="bg1"/>
+                  </a:solidFill>
+                  <a:cs typeface="Arial" pitchFamily="34" charset="0"/>
+                </a:rPr>
+                <a:t>Trúc</a:t>
+              </a:r>
+              <a:r>
+                <a:rPr lang="en-US" altLang="ko-KR" sz="2800" b="1" dirty="0" smtClean="0">
+                  <a:solidFill>
+                    <a:schemeClr val="bg1"/>
+                  </a:solidFill>
+                  <a:cs typeface="Arial" pitchFamily="34" charset="0"/>
+                </a:rPr>
+                <a:t> </a:t>
+              </a:r>
+              <a:r>
+                <a:rPr lang="en-US" altLang="ko-KR" sz="2800" b="1" dirty="0" err="1" smtClean="0">
+                  <a:solidFill>
+                    <a:schemeClr val="bg1"/>
+                  </a:solidFill>
+                  <a:cs typeface="Arial" pitchFamily="34" charset="0"/>
+                </a:rPr>
+                <a:t>Anh</a:t>
+              </a:r>
               <a:endParaRPr lang="ko-KR" altLang="en-US" sz="2800" b="1" dirty="0">
                 <a:solidFill>
                   <a:schemeClr val="bg1"/>
@@ -5922,7 +6093,7 @@
             <p:cNvPr id="7" name="TextBox 6">
               <a:extLst>
                 <a:ext uri="{FF2B5EF4-FFF2-40B4-BE49-F238E27FC236}">
-                  <a16:creationId xmlns:a16="http://schemas.microsoft.com/office/drawing/2014/main" xmlns="" id="{89D53A5A-B18B-4EDC-BA10-843AF3775AB4}"/>
+                  <a16:creationId xmlns="" xmlns:a16="http://schemas.microsoft.com/office/drawing/2014/main" id="{89D53A5A-B18B-4EDC-BA10-843AF3775AB4}"/>
                 </a:ext>
               </a:extLst>
             </p:cNvPr>
@@ -5970,7 +6141,7 @@
           <p:cNvPr id="16" name="TextBox 15">
             <a:extLst>
               <a:ext uri="{FF2B5EF4-FFF2-40B4-BE49-F238E27FC236}">
-                <a16:creationId xmlns:a16="http://schemas.microsoft.com/office/drawing/2014/main" xmlns="" id="{89D53A5A-B18B-4EDC-BA10-843AF3775AB4}"/>
+                <a16:creationId xmlns="" xmlns:a16="http://schemas.microsoft.com/office/drawing/2014/main" id="{89D53A5A-B18B-4EDC-BA10-843AF3775AB4}"/>
               </a:ext>
             </a:extLst>
           </p:cNvPr>
@@ -6107,7 +6278,7 @@
           <p:cNvPr id="2" name="Text Placeholder 1">
             <a:extLst>
               <a:ext uri="{FF2B5EF4-FFF2-40B4-BE49-F238E27FC236}">
-                <a16:creationId xmlns:a16="http://schemas.microsoft.com/office/drawing/2014/main" xmlns="" id="{D735F7F3-C1B5-4B60-A00A-4EB618DDFB5A}"/>
+                <a16:creationId xmlns="" xmlns:a16="http://schemas.microsoft.com/office/drawing/2014/main" id="{D735F7F3-C1B5-4B60-A00A-4EB618DDFB5A}"/>
               </a:ext>
             </a:extLst>
           </p:cNvPr>
@@ -6172,7 +6343,7 @@
           <p:cNvPr id="3" name="Group 2">
             <a:extLst>
               <a:ext uri="{FF2B5EF4-FFF2-40B4-BE49-F238E27FC236}">
-                <a16:creationId xmlns:a16="http://schemas.microsoft.com/office/drawing/2014/main" xmlns="" id="{F6915FD2-D0E6-4DEB-B1C9-9340552A3344}"/>
+                <a16:creationId xmlns="" xmlns:a16="http://schemas.microsoft.com/office/drawing/2014/main" id="{F6915FD2-D0E6-4DEB-B1C9-9340552A3344}"/>
               </a:ext>
             </a:extLst>
           </p:cNvPr>
@@ -6192,7 +6363,7 @@
             <p:cNvPr id="4" name="Freeform: Shape 3">
               <a:extLst>
                 <a:ext uri="{FF2B5EF4-FFF2-40B4-BE49-F238E27FC236}">
-                  <a16:creationId xmlns:a16="http://schemas.microsoft.com/office/drawing/2014/main" xmlns="" id="{D1D8A4D9-073F-4BB6-A662-1EFDCB85E80C}"/>
+                  <a16:creationId xmlns="" xmlns:a16="http://schemas.microsoft.com/office/drawing/2014/main" id="{D1D8A4D9-073F-4BB6-A662-1EFDCB85E80C}"/>
                 </a:ext>
               </a:extLst>
             </p:cNvPr>
@@ -6400,7 +6571,7 @@
             <p:cNvPr id="5" name="Freeform: Shape 4">
               <a:extLst>
                 <a:ext uri="{FF2B5EF4-FFF2-40B4-BE49-F238E27FC236}">
-                  <a16:creationId xmlns:a16="http://schemas.microsoft.com/office/drawing/2014/main" xmlns="" id="{07DF9A70-42B4-4956-A6DE-65EC83042B41}"/>
+                  <a16:creationId xmlns="" xmlns:a16="http://schemas.microsoft.com/office/drawing/2014/main" id="{07DF9A70-42B4-4956-A6DE-65EC83042B41}"/>
                 </a:ext>
               </a:extLst>
             </p:cNvPr>
@@ -6548,7 +6719,7 @@
             <p:cNvPr id="6" name="Freeform: Shape 5">
               <a:extLst>
                 <a:ext uri="{FF2B5EF4-FFF2-40B4-BE49-F238E27FC236}">
-                  <a16:creationId xmlns:a16="http://schemas.microsoft.com/office/drawing/2014/main" xmlns="" id="{A1EA2B28-8846-4C7F-88A9-8ADBC0501178}"/>
+                  <a16:creationId xmlns="" xmlns:a16="http://schemas.microsoft.com/office/drawing/2014/main" id="{A1EA2B28-8846-4C7F-88A9-8ADBC0501178}"/>
                 </a:ext>
               </a:extLst>
             </p:cNvPr>
@@ -7183,7 +7354,7 @@
             <p:cNvPr id="7" name="Freeform: Shape 6">
               <a:extLst>
                 <a:ext uri="{FF2B5EF4-FFF2-40B4-BE49-F238E27FC236}">
-                  <a16:creationId xmlns:a16="http://schemas.microsoft.com/office/drawing/2014/main" xmlns="" id="{BF3EF62E-06EA-4D0D-A441-B65B6FB961EF}"/>
+                  <a16:creationId xmlns="" xmlns:a16="http://schemas.microsoft.com/office/drawing/2014/main" id="{BF3EF62E-06EA-4D0D-A441-B65B6FB961EF}"/>
                 </a:ext>
               </a:extLst>
             </p:cNvPr>
@@ -8062,7 +8233,7 @@
             <p:cNvPr id="8" name="Freeform: Shape 7">
               <a:extLst>
                 <a:ext uri="{FF2B5EF4-FFF2-40B4-BE49-F238E27FC236}">
-                  <a16:creationId xmlns:a16="http://schemas.microsoft.com/office/drawing/2014/main" xmlns="" id="{2E20A684-E434-40C4-84DE-66387E9E9CDA}"/>
+                  <a16:creationId xmlns="" xmlns:a16="http://schemas.microsoft.com/office/drawing/2014/main" id="{2E20A684-E434-40C4-84DE-66387E9E9CDA}"/>
                 </a:ext>
               </a:extLst>
             </p:cNvPr>
@@ -8398,7 +8569,7 @@
             <p:cNvPr id="9" name="Freeform: Shape 8">
               <a:extLst>
                 <a:ext uri="{FF2B5EF4-FFF2-40B4-BE49-F238E27FC236}">
-                  <a16:creationId xmlns:a16="http://schemas.microsoft.com/office/drawing/2014/main" xmlns="" id="{32723C70-5094-47B0-BC93-ED8A527333DB}"/>
+                  <a16:creationId xmlns="" xmlns:a16="http://schemas.microsoft.com/office/drawing/2014/main" id="{32723C70-5094-47B0-BC93-ED8A527333DB}"/>
                 </a:ext>
               </a:extLst>
             </p:cNvPr>
@@ -8624,7 +8795,7 @@
             <p:cNvPr id="10" name="Freeform: Shape 9">
               <a:extLst>
                 <a:ext uri="{FF2B5EF4-FFF2-40B4-BE49-F238E27FC236}">
-                  <a16:creationId xmlns:a16="http://schemas.microsoft.com/office/drawing/2014/main" xmlns="" id="{B1EF34FD-D5C4-4393-B6D7-67E4DFF7534A}"/>
+                  <a16:creationId xmlns="" xmlns:a16="http://schemas.microsoft.com/office/drawing/2014/main" id="{B1EF34FD-D5C4-4393-B6D7-67E4DFF7534A}"/>
                 </a:ext>
               </a:extLst>
             </p:cNvPr>
@@ -8906,7 +9077,7 @@
             <p:cNvPr id="11" name="Freeform: Shape 10">
               <a:extLst>
                 <a:ext uri="{FF2B5EF4-FFF2-40B4-BE49-F238E27FC236}">
-                  <a16:creationId xmlns:a16="http://schemas.microsoft.com/office/drawing/2014/main" xmlns="" id="{FF4A134F-9F05-4D10-8F90-D5BBBDC78A1A}"/>
+                  <a16:creationId xmlns="" xmlns:a16="http://schemas.microsoft.com/office/drawing/2014/main" id="{FF4A134F-9F05-4D10-8F90-D5BBBDC78A1A}"/>
                 </a:ext>
               </a:extLst>
             </p:cNvPr>
@@ -10940,7 +11111,7 @@
             <p:cNvPr id="12" name="Group 11">
               <a:extLst>
                 <a:ext uri="{FF2B5EF4-FFF2-40B4-BE49-F238E27FC236}">
-                  <a16:creationId xmlns:a16="http://schemas.microsoft.com/office/drawing/2014/main" xmlns="" id="{E5F9C0EC-A17E-433A-8DA0-F9E36EE2B618}"/>
+                  <a16:creationId xmlns="" xmlns:a16="http://schemas.microsoft.com/office/drawing/2014/main" id="{E5F9C0EC-A17E-433A-8DA0-F9E36EE2B618}"/>
                 </a:ext>
               </a:extLst>
             </p:cNvPr>
@@ -10960,7 +11131,7 @@
               <p:cNvPr id="16" name="Freeform: Shape 15">
                 <a:extLst>
                   <a:ext uri="{FF2B5EF4-FFF2-40B4-BE49-F238E27FC236}">
-                    <a16:creationId xmlns:a16="http://schemas.microsoft.com/office/drawing/2014/main" xmlns="" id="{C2A4C65E-0C75-4DB0-82EF-744D0558FF37}"/>
+                    <a16:creationId xmlns="" xmlns:a16="http://schemas.microsoft.com/office/drawing/2014/main" id="{C2A4C65E-0C75-4DB0-82EF-744D0558FF37}"/>
                   </a:ext>
                 </a:extLst>
               </p:cNvPr>
@@ -11056,7 +11227,7 @@
               <p:cNvPr id="17" name="Freeform: Shape 16">
                 <a:extLst>
                   <a:ext uri="{FF2B5EF4-FFF2-40B4-BE49-F238E27FC236}">
-                    <a16:creationId xmlns:a16="http://schemas.microsoft.com/office/drawing/2014/main" xmlns="" id="{8AB7B3CA-67A1-4869-BE7B-1BEA69037B5E}"/>
+                    <a16:creationId xmlns="" xmlns:a16="http://schemas.microsoft.com/office/drawing/2014/main" id="{8AB7B3CA-67A1-4869-BE7B-1BEA69037B5E}"/>
                   </a:ext>
                 </a:extLst>
               </p:cNvPr>
@@ -11172,7 +11343,7 @@
               <p:cNvPr id="18" name="Freeform: Shape 17">
                 <a:extLst>
                   <a:ext uri="{FF2B5EF4-FFF2-40B4-BE49-F238E27FC236}">
-                    <a16:creationId xmlns:a16="http://schemas.microsoft.com/office/drawing/2014/main" xmlns="" id="{4D98CE6B-6D12-45B9-A830-4F286947E6BE}"/>
+                    <a16:creationId xmlns="" xmlns:a16="http://schemas.microsoft.com/office/drawing/2014/main" id="{4D98CE6B-6D12-45B9-A830-4F286947E6BE}"/>
                   </a:ext>
                 </a:extLst>
               </p:cNvPr>
@@ -11298,7 +11469,7 @@
               <p:cNvPr id="19" name="Freeform: Shape 18">
                 <a:extLst>
                   <a:ext uri="{FF2B5EF4-FFF2-40B4-BE49-F238E27FC236}">
-                    <a16:creationId xmlns:a16="http://schemas.microsoft.com/office/drawing/2014/main" xmlns="" id="{A65AE8CE-85F5-4CEF-80A8-3599D73F25D1}"/>
+                    <a16:creationId xmlns="" xmlns:a16="http://schemas.microsoft.com/office/drawing/2014/main" id="{A65AE8CE-85F5-4CEF-80A8-3599D73F25D1}"/>
                   </a:ext>
                 </a:extLst>
               </p:cNvPr>
@@ -11424,7 +11595,7 @@
               <p:cNvPr id="20" name="Freeform: Shape 19">
                 <a:extLst>
                   <a:ext uri="{FF2B5EF4-FFF2-40B4-BE49-F238E27FC236}">
-                    <a16:creationId xmlns:a16="http://schemas.microsoft.com/office/drawing/2014/main" xmlns="" id="{4FC040DF-8608-444D-92AC-39F0AE68CB07}"/>
+                    <a16:creationId xmlns="" xmlns:a16="http://schemas.microsoft.com/office/drawing/2014/main" id="{4FC040DF-8608-444D-92AC-39F0AE68CB07}"/>
                   </a:ext>
                 </a:extLst>
               </p:cNvPr>
@@ -11520,7 +11691,7 @@
               <p:cNvPr id="21" name="Freeform: Shape 20">
                 <a:extLst>
                   <a:ext uri="{FF2B5EF4-FFF2-40B4-BE49-F238E27FC236}">
-                    <a16:creationId xmlns:a16="http://schemas.microsoft.com/office/drawing/2014/main" xmlns="" id="{1389FFD7-DE4F-47D1-9314-82320CDDE13E}"/>
+                    <a16:creationId xmlns="" xmlns:a16="http://schemas.microsoft.com/office/drawing/2014/main" id="{1389FFD7-DE4F-47D1-9314-82320CDDE13E}"/>
                   </a:ext>
                 </a:extLst>
               </p:cNvPr>
@@ -11617,7 +11788,7 @@
             <p:cNvPr id="13" name="Freeform: Shape 12">
               <a:extLst>
                 <a:ext uri="{FF2B5EF4-FFF2-40B4-BE49-F238E27FC236}">
-                  <a16:creationId xmlns:a16="http://schemas.microsoft.com/office/drawing/2014/main" xmlns="" id="{E972D6D6-3A17-4A2E-AAB1-897CF6022D4F}"/>
+                  <a16:creationId xmlns="" xmlns:a16="http://schemas.microsoft.com/office/drawing/2014/main" id="{E972D6D6-3A17-4A2E-AAB1-897CF6022D4F}"/>
                 </a:ext>
               </a:extLst>
             </p:cNvPr>
@@ -12050,7 +12221,7 @@
             <p:cNvPr id="14" name="Freeform: Shape 13">
               <a:extLst>
                 <a:ext uri="{FF2B5EF4-FFF2-40B4-BE49-F238E27FC236}">
-                  <a16:creationId xmlns:a16="http://schemas.microsoft.com/office/drawing/2014/main" xmlns="" id="{C3898C49-F9BC-4092-B007-970A80368E3F}"/>
+                  <a16:creationId xmlns="" xmlns:a16="http://schemas.microsoft.com/office/drawing/2014/main" id="{C3898C49-F9BC-4092-B007-970A80368E3F}"/>
                 </a:ext>
               </a:extLst>
             </p:cNvPr>
@@ -14131,7 +14302,7 @@
             <p:cNvPr id="15" name="Freeform: Shape 14">
               <a:extLst>
                 <a:ext uri="{FF2B5EF4-FFF2-40B4-BE49-F238E27FC236}">
-                  <a16:creationId xmlns:a16="http://schemas.microsoft.com/office/drawing/2014/main" xmlns="" id="{4BECFD8E-5027-4C50-A0BB-AC8B7749E800}"/>
+                  <a16:creationId xmlns="" xmlns:a16="http://schemas.microsoft.com/office/drawing/2014/main" id="{4BECFD8E-5027-4C50-A0BB-AC8B7749E800}"/>
                 </a:ext>
               </a:extLst>
             </p:cNvPr>
@@ -14448,7 +14619,7 @@
           <p:cNvPr id="33" name="TextBox 32">
             <a:extLst>
               <a:ext uri="{FF2B5EF4-FFF2-40B4-BE49-F238E27FC236}">
-                <a16:creationId xmlns:a16="http://schemas.microsoft.com/office/drawing/2014/main" xmlns="" id="{9B583191-69B8-463E-8E8A-295A73BDD1DC}"/>
+                <a16:creationId xmlns="" xmlns:a16="http://schemas.microsoft.com/office/drawing/2014/main" id="{9B583191-69B8-463E-8E8A-295A73BDD1DC}"/>
               </a:ext>
             </a:extLst>
           </p:cNvPr>
@@ -15213,7 +15384,7 @@
           <p:cNvPr id="2" name="Text Placeholder 1">
             <a:extLst>
               <a:ext uri="{FF2B5EF4-FFF2-40B4-BE49-F238E27FC236}">
-                <a16:creationId xmlns:a16="http://schemas.microsoft.com/office/drawing/2014/main" xmlns="" id="{D735F7F3-C1B5-4B60-A00A-4EB618DDFB5A}"/>
+                <a16:creationId xmlns="" xmlns:a16="http://schemas.microsoft.com/office/drawing/2014/main" id="{D735F7F3-C1B5-4B60-A00A-4EB618DDFB5A}"/>
               </a:ext>
             </a:extLst>
           </p:cNvPr>
@@ -15266,7 +15437,7 @@
           <p:cNvPr id="3" name="Group 2">
             <a:extLst>
               <a:ext uri="{FF2B5EF4-FFF2-40B4-BE49-F238E27FC236}">
-                <a16:creationId xmlns:a16="http://schemas.microsoft.com/office/drawing/2014/main" xmlns="" id="{F6915FD2-D0E6-4DEB-B1C9-9340552A3344}"/>
+                <a16:creationId xmlns="" xmlns:a16="http://schemas.microsoft.com/office/drawing/2014/main" id="{F6915FD2-D0E6-4DEB-B1C9-9340552A3344}"/>
               </a:ext>
             </a:extLst>
           </p:cNvPr>
@@ -15286,7 +15457,7 @@
             <p:cNvPr id="4" name="Freeform: Shape 3">
               <a:extLst>
                 <a:ext uri="{FF2B5EF4-FFF2-40B4-BE49-F238E27FC236}">
-                  <a16:creationId xmlns:a16="http://schemas.microsoft.com/office/drawing/2014/main" xmlns="" id="{D1D8A4D9-073F-4BB6-A662-1EFDCB85E80C}"/>
+                  <a16:creationId xmlns="" xmlns:a16="http://schemas.microsoft.com/office/drawing/2014/main" id="{D1D8A4D9-073F-4BB6-A662-1EFDCB85E80C}"/>
                 </a:ext>
               </a:extLst>
             </p:cNvPr>
@@ -15494,7 +15665,7 @@
             <p:cNvPr id="5" name="Freeform: Shape 4">
               <a:extLst>
                 <a:ext uri="{FF2B5EF4-FFF2-40B4-BE49-F238E27FC236}">
-                  <a16:creationId xmlns:a16="http://schemas.microsoft.com/office/drawing/2014/main" xmlns="" id="{07DF9A70-42B4-4956-A6DE-65EC83042B41}"/>
+                  <a16:creationId xmlns="" xmlns:a16="http://schemas.microsoft.com/office/drawing/2014/main" id="{07DF9A70-42B4-4956-A6DE-65EC83042B41}"/>
                 </a:ext>
               </a:extLst>
             </p:cNvPr>
@@ -15642,7 +15813,7 @@
             <p:cNvPr id="6" name="Freeform: Shape 5">
               <a:extLst>
                 <a:ext uri="{FF2B5EF4-FFF2-40B4-BE49-F238E27FC236}">
-                  <a16:creationId xmlns:a16="http://schemas.microsoft.com/office/drawing/2014/main" xmlns="" id="{A1EA2B28-8846-4C7F-88A9-8ADBC0501178}"/>
+                  <a16:creationId xmlns="" xmlns:a16="http://schemas.microsoft.com/office/drawing/2014/main" id="{A1EA2B28-8846-4C7F-88A9-8ADBC0501178}"/>
                 </a:ext>
               </a:extLst>
             </p:cNvPr>
@@ -16277,7 +16448,7 @@
             <p:cNvPr id="7" name="Freeform: Shape 6">
               <a:extLst>
                 <a:ext uri="{FF2B5EF4-FFF2-40B4-BE49-F238E27FC236}">
-                  <a16:creationId xmlns:a16="http://schemas.microsoft.com/office/drawing/2014/main" xmlns="" id="{BF3EF62E-06EA-4D0D-A441-B65B6FB961EF}"/>
+                  <a16:creationId xmlns="" xmlns:a16="http://schemas.microsoft.com/office/drawing/2014/main" id="{BF3EF62E-06EA-4D0D-A441-B65B6FB961EF}"/>
                 </a:ext>
               </a:extLst>
             </p:cNvPr>
@@ -17156,7 +17327,7 @@
             <p:cNvPr id="8" name="Freeform: Shape 7">
               <a:extLst>
                 <a:ext uri="{FF2B5EF4-FFF2-40B4-BE49-F238E27FC236}">
-                  <a16:creationId xmlns:a16="http://schemas.microsoft.com/office/drawing/2014/main" xmlns="" id="{2E20A684-E434-40C4-84DE-66387E9E9CDA}"/>
+                  <a16:creationId xmlns="" xmlns:a16="http://schemas.microsoft.com/office/drawing/2014/main" id="{2E20A684-E434-40C4-84DE-66387E9E9CDA}"/>
                 </a:ext>
               </a:extLst>
             </p:cNvPr>
@@ -17492,7 +17663,7 @@
             <p:cNvPr id="9" name="Freeform: Shape 8">
               <a:extLst>
                 <a:ext uri="{FF2B5EF4-FFF2-40B4-BE49-F238E27FC236}">
-                  <a16:creationId xmlns:a16="http://schemas.microsoft.com/office/drawing/2014/main" xmlns="" id="{32723C70-5094-47B0-BC93-ED8A527333DB}"/>
+                  <a16:creationId xmlns="" xmlns:a16="http://schemas.microsoft.com/office/drawing/2014/main" id="{32723C70-5094-47B0-BC93-ED8A527333DB}"/>
                 </a:ext>
               </a:extLst>
             </p:cNvPr>
@@ -17718,7 +17889,7 @@
             <p:cNvPr id="10" name="Freeform: Shape 9">
               <a:extLst>
                 <a:ext uri="{FF2B5EF4-FFF2-40B4-BE49-F238E27FC236}">
-                  <a16:creationId xmlns:a16="http://schemas.microsoft.com/office/drawing/2014/main" xmlns="" id="{B1EF34FD-D5C4-4393-B6D7-67E4DFF7534A}"/>
+                  <a16:creationId xmlns="" xmlns:a16="http://schemas.microsoft.com/office/drawing/2014/main" id="{B1EF34FD-D5C4-4393-B6D7-67E4DFF7534A}"/>
                 </a:ext>
               </a:extLst>
             </p:cNvPr>
@@ -18000,7 +18171,7 @@
             <p:cNvPr id="11" name="Freeform: Shape 10">
               <a:extLst>
                 <a:ext uri="{FF2B5EF4-FFF2-40B4-BE49-F238E27FC236}">
-                  <a16:creationId xmlns:a16="http://schemas.microsoft.com/office/drawing/2014/main" xmlns="" id="{FF4A134F-9F05-4D10-8F90-D5BBBDC78A1A}"/>
+                  <a16:creationId xmlns="" xmlns:a16="http://schemas.microsoft.com/office/drawing/2014/main" id="{FF4A134F-9F05-4D10-8F90-D5BBBDC78A1A}"/>
                 </a:ext>
               </a:extLst>
             </p:cNvPr>
@@ -20034,7 +20205,7 @@
             <p:cNvPr id="12" name="Group 11">
               <a:extLst>
                 <a:ext uri="{FF2B5EF4-FFF2-40B4-BE49-F238E27FC236}">
-                  <a16:creationId xmlns:a16="http://schemas.microsoft.com/office/drawing/2014/main" xmlns="" id="{E5F9C0EC-A17E-433A-8DA0-F9E36EE2B618}"/>
+                  <a16:creationId xmlns="" xmlns:a16="http://schemas.microsoft.com/office/drawing/2014/main" id="{E5F9C0EC-A17E-433A-8DA0-F9E36EE2B618}"/>
                 </a:ext>
               </a:extLst>
             </p:cNvPr>
@@ -20054,7 +20225,7 @@
               <p:cNvPr id="16" name="Freeform: Shape 15">
                 <a:extLst>
                   <a:ext uri="{FF2B5EF4-FFF2-40B4-BE49-F238E27FC236}">
-                    <a16:creationId xmlns:a16="http://schemas.microsoft.com/office/drawing/2014/main" xmlns="" id="{C2A4C65E-0C75-4DB0-82EF-744D0558FF37}"/>
+                    <a16:creationId xmlns="" xmlns:a16="http://schemas.microsoft.com/office/drawing/2014/main" id="{C2A4C65E-0C75-4DB0-82EF-744D0558FF37}"/>
                   </a:ext>
                 </a:extLst>
               </p:cNvPr>
@@ -20150,7 +20321,7 @@
               <p:cNvPr id="17" name="Freeform: Shape 16">
                 <a:extLst>
                   <a:ext uri="{FF2B5EF4-FFF2-40B4-BE49-F238E27FC236}">
-                    <a16:creationId xmlns:a16="http://schemas.microsoft.com/office/drawing/2014/main" xmlns="" id="{8AB7B3CA-67A1-4869-BE7B-1BEA69037B5E}"/>
+                    <a16:creationId xmlns="" xmlns:a16="http://schemas.microsoft.com/office/drawing/2014/main" id="{8AB7B3CA-67A1-4869-BE7B-1BEA69037B5E}"/>
                   </a:ext>
                 </a:extLst>
               </p:cNvPr>
@@ -20266,7 +20437,7 @@
               <p:cNvPr id="18" name="Freeform: Shape 17">
                 <a:extLst>
                   <a:ext uri="{FF2B5EF4-FFF2-40B4-BE49-F238E27FC236}">
-                    <a16:creationId xmlns:a16="http://schemas.microsoft.com/office/drawing/2014/main" xmlns="" id="{4D98CE6B-6D12-45B9-A830-4F286947E6BE}"/>
+                    <a16:creationId xmlns="" xmlns:a16="http://schemas.microsoft.com/office/drawing/2014/main" id="{4D98CE6B-6D12-45B9-A830-4F286947E6BE}"/>
                   </a:ext>
                 </a:extLst>
               </p:cNvPr>
@@ -20392,7 +20563,7 @@
               <p:cNvPr id="19" name="Freeform: Shape 18">
                 <a:extLst>
                   <a:ext uri="{FF2B5EF4-FFF2-40B4-BE49-F238E27FC236}">
-                    <a16:creationId xmlns:a16="http://schemas.microsoft.com/office/drawing/2014/main" xmlns="" id="{A65AE8CE-85F5-4CEF-80A8-3599D73F25D1}"/>
+                    <a16:creationId xmlns="" xmlns:a16="http://schemas.microsoft.com/office/drawing/2014/main" id="{A65AE8CE-85F5-4CEF-80A8-3599D73F25D1}"/>
                   </a:ext>
                 </a:extLst>
               </p:cNvPr>
@@ -20518,7 +20689,7 @@
               <p:cNvPr id="20" name="Freeform: Shape 19">
                 <a:extLst>
                   <a:ext uri="{FF2B5EF4-FFF2-40B4-BE49-F238E27FC236}">
-                    <a16:creationId xmlns:a16="http://schemas.microsoft.com/office/drawing/2014/main" xmlns="" id="{4FC040DF-8608-444D-92AC-39F0AE68CB07}"/>
+                    <a16:creationId xmlns="" xmlns:a16="http://schemas.microsoft.com/office/drawing/2014/main" id="{4FC040DF-8608-444D-92AC-39F0AE68CB07}"/>
                   </a:ext>
                 </a:extLst>
               </p:cNvPr>
@@ -20614,7 +20785,7 @@
               <p:cNvPr id="21" name="Freeform: Shape 20">
                 <a:extLst>
                   <a:ext uri="{FF2B5EF4-FFF2-40B4-BE49-F238E27FC236}">
-                    <a16:creationId xmlns:a16="http://schemas.microsoft.com/office/drawing/2014/main" xmlns="" id="{1389FFD7-DE4F-47D1-9314-82320CDDE13E}"/>
+                    <a16:creationId xmlns="" xmlns:a16="http://schemas.microsoft.com/office/drawing/2014/main" id="{1389FFD7-DE4F-47D1-9314-82320CDDE13E}"/>
                   </a:ext>
                 </a:extLst>
               </p:cNvPr>
@@ -20711,7 +20882,7 @@
             <p:cNvPr id="13" name="Freeform: Shape 12">
               <a:extLst>
                 <a:ext uri="{FF2B5EF4-FFF2-40B4-BE49-F238E27FC236}">
-                  <a16:creationId xmlns:a16="http://schemas.microsoft.com/office/drawing/2014/main" xmlns="" id="{E972D6D6-3A17-4A2E-AAB1-897CF6022D4F}"/>
+                  <a16:creationId xmlns="" xmlns:a16="http://schemas.microsoft.com/office/drawing/2014/main" id="{E972D6D6-3A17-4A2E-AAB1-897CF6022D4F}"/>
                 </a:ext>
               </a:extLst>
             </p:cNvPr>
@@ -21144,7 +21315,7 @@
             <p:cNvPr id="14" name="Freeform: Shape 13">
               <a:extLst>
                 <a:ext uri="{FF2B5EF4-FFF2-40B4-BE49-F238E27FC236}">
-                  <a16:creationId xmlns:a16="http://schemas.microsoft.com/office/drawing/2014/main" xmlns="" id="{C3898C49-F9BC-4092-B007-970A80368E3F}"/>
+                  <a16:creationId xmlns="" xmlns:a16="http://schemas.microsoft.com/office/drawing/2014/main" id="{C3898C49-F9BC-4092-B007-970A80368E3F}"/>
                 </a:ext>
               </a:extLst>
             </p:cNvPr>
@@ -23225,7 +23396,7 @@
             <p:cNvPr id="15" name="Freeform: Shape 14">
               <a:extLst>
                 <a:ext uri="{FF2B5EF4-FFF2-40B4-BE49-F238E27FC236}">
-                  <a16:creationId xmlns:a16="http://schemas.microsoft.com/office/drawing/2014/main" xmlns="" id="{4BECFD8E-5027-4C50-A0BB-AC8B7749E800}"/>
+                  <a16:creationId xmlns="" xmlns:a16="http://schemas.microsoft.com/office/drawing/2014/main" id="{4BECFD8E-5027-4C50-A0BB-AC8B7749E800}"/>
                 </a:ext>
               </a:extLst>
             </p:cNvPr>
@@ -23542,7 +23713,7 @@
           <p:cNvPr id="33" name="TextBox 32">
             <a:extLst>
               <a:ext uri="{FF2B5EF4-FFF2-40B4-BE49-F238E27FC236}">
-                <a16:creationId xmlns:a16="http://schemas.microsoft.com/office/drawing/2014/main" xmlns="" id="{9B583191-69B8-463E-8E8A-295A73BDD1DC}"/>
+                <a16:creationId xmlns="" xmlns:a16="http://schemas.microsoft.com/office/drawing/2014/main" id="{9B583191-69B8-463E-8E8A-295A73BDD1DC}"/>
               </a:ext>
             </a:extLst>
           </p:cNvPr>
@@ -23657,10 +23828,16 @@
               <a:t> </a:t>
             </a:r>
             <a:r>
+              <a:rPr lang="en-US" altLang="ko-KR" sz="2400" dirty="0" err="1">
+                <a:cs typeface="Arial" pitchFamily="34" charset="0"/>
+              </a:rPr>
+              <a:t>C</a:t>
+            </a:r>
+            <a:r>
               <a:rPr lang="en-US" altLang="ko-KR" sz="2400" dirty="0" err="1" smtClean="0">
                 <a:cs typeface="Arial" pitchFamily="34" charset="0"/>
               </a:rPr>
-              <a:t>cơ</a:t>
+              <a:t>ơ</a:t>
             </a:r>
             <a:r>
               <a:rPr lang="en-US" altLang="ko-KR" sz="2400" dirty="0" smtClean="0">
@@ -23729,7 +23906,19 @@
               <a:rPr lang="en-US" altLang="ko-KR" sz="2400" dirty="0" smtClean="0">
                 <a:cs typeface="Arial" pitchFamily="34" charset="0"/>
               </a:rPr>
-              <a:t> bootstrap, </a:t>
+              <a:t> </a:t>
+            </a:r>
+            <a:r>
+              <a:rPr lang="en-US" altLang="ko-KR" sz="2400" dirty="0" smtClean="0">
+                <a:cs typeface="Arial" pitchFamily="34" charset="0"/>
+              </a:rPr>
+              <a:t>Bootstrap</a:t>
+            </a:r>
+            <a:r>
+              <a:rPr lang="en-US" altLang="ko-KR" sz="2400" dirty="0" smtClean="0">
+                <a:cs typeface="Arial" pitchFamily="34" charset="0"/>
+              </a:rPr>
+              <a:t>, </a:t>
             </a:r>
             <a:r>
               <a:rPr lang="en-US" altLang="ko-KR" sz="2400" dirty="0" err="1" smtClean="0">
@@ -23806,7 +23995,7 @@
           <p:cNvPr id="8" name="TextBox 7">
             <a:extLst>
               <a:ext uri="{FF2B5EF4-FFF2-40B4-BE49-F238E27FC236}">
-                <a16:creationId xmlns:a16="http://schemas.microsoft.com/office/drawing/2014/main" xmlns="" id="{5CF5BDA4-10C7-46A6-AC30-523A3FC438AC}"/>
+                <a16:creationId xmlns="" xmlns:a16="http://schemas.microsoft.com/office/drawing/2014/main" id="{5CF5BDA4-10C7-46A6-AC30-523A3FC438AC}"/>
               </a:ext>
             </a:extLst>
           </p:cNvPr>
@@ -23971,7 +24160,7 @@
           <p:cNvPr id="2" name="Text Placeholder 1">
             <a:extLst>
               <a:ext uri="{FF2B5EF4-FFF2-40B4-BE49-F238E27FC236}">
-                <a16:creationId xmlns:a16="http://schemas.microsoft.com/office/drawing/2014/main" xmlns="" id="{D735F7F3-C1B5-4B60-A00A-4EB618DDFB5A}"/>
+                <a16:creationId xmlns="" xmlns:a16="http://schemas.microsoft.com/office/drawing/2014/main" id="{D735F7F3-C1B5-4B60-A00A-4EB618DDFB5A}"/>
               </a:ext>
             </a:extLst>
           </p:cNvPr>
@@ -24137,7 +24326,7 @@
           <p:cNvPr id="8" name="TextBox 7">
             <a:extLst>
               <a:ext uri="{FF2B5EF4-FFF2-40B4-BE49-F238E27FC236}">
-                <a16:creationId xmlns:a16="http://schemas.microsoft.com/office/drawing/2014/main" xmlns="" id="{5CF5BDA4-10C7-46A6-AC30-523A3FC438AC}"/>
+                <a16:creationId xmlns="" xmlns:a16="http://schemas.microsoft.com/office/drawing/2014/main" id="{5CF5BDA4-10C7-46A6-AC30-523A3FC438AC}"/>
               </a:ext>
             </a:extLst>
           </p:cNvPr>
@@ -25461,7 +25650,7 @@
   <a:extraClrSchemeLst/>
   <a:extLst>
     <a:ext uri="{05A4C25C-085E-4340-85A3-A5531E510DB2}">
-      <thm15:themeFamily xmlns:thm15="http://schemas.microsoft.com/office/thememl/2012/main" xmlns="" name="Office Theme" id="{62F939B6-93AF-4DB8-9C6B-D6C7DFDC589F}" vid="{4A3C46E8-61CC-4603-A589-7422A47A8E4A}"/>
+      <thm15:themeFamily xmlns="" xmlns:thm15="http://schemas.microsoft.com/office/thememl/2012/main" name="Office Theme" id="{62F939B6-93AF-4DB8-9C6B-D6C7DFDC589F}" vid="{4A3C46E8-61CC-4603-A589-7422A47A8E4A}"/>
     </a:ext>
   </a:extLst>
 </a:theme>
@@ -25662,7 +25851,7 @@
   <a:extraClrSchemeLst/>
   <a:extLst>
     <a:ext uri="{05A4C25C-085E-4340-85A3-A5531E510DB2}">
-      <thm15:themeFamily xmlns:thm15="http://schemas.microsoft.com/office/thememl/2012/main" xmlns="" name="Office Theme" id="{62F939B6-93AF-4DB8-9C6B-D6C7DFDC589F}" vid="{4A3C46E8-61CC-4603-A589-7422A47A8E4A}"/>
+      <thm15:themeFamily xmlns="" xmlns:thm15="http://schemas.microsoft.com/office/thememl/2012/main" name="Office Theme" id="{62F939B6-93AF-4DB8-9C6B-D6C7DFDC589F}" vid="{4A3C46E8-61CC-4603-A589-7422A47A8E4A}"/>
     </a:ext>
   </a:extLst>
 </a:theme>
@@ -25863,7 +26052,7 @@
   <a:extraClrSchemeLst/>
   <a:extLst>
     <a:ext uri="{05A4C25C-085E-4340-85A3-A5531E510DB2}">
-      <thm15:themeFamily xmlns:thm15="http://schemas.microsoft.com/office/thememl/2012/main" xmlns="" name="Office Theme" id="{62F939B6-93AF-4DB8-9C6B-D6C7DFDC589F}" vid="{4A3C46E8-61CC-4603-A589-7422A47A8E4A}"/>
+      <thm15:themeFamily xmlns="" xmlns:thm15="http://schemas.microsoft.com/office/thememl/2012/main" name="Office Theme" id="{62F939B6-93AF-4DB8-9C6B-D6C7DFDC589F}" vid="{4A3C46E8-61CC-4603-A589-7422A47A8E4A}"/>
     </a:ext>
   </a:extLst>
 </a:theme>

</xml_diff>